<commit_message>
in c up 74 program, and sum notes
</commit_message>
<xml_diff>
--- a/BCA/Introduction to HTMLCSS-XML (P)F1.pptx
+++ b/BCA/Introduction to HTMLCSS-XML (P)F1.pptx
@@ -261,7 +261,7 @@
           <a:p>
             <a:fld id="{A836C3DE-AC88-4268-9D6B-389508348846}" type="datetimeFigureOut">
               <a:rPr lang="en-IN" smtClean="0"/>
-              <a:t>04-08-2024</a:t>
+              <a:t>22-11-2024</a:t>
             </a:fld>
             <a:endParaRPr lang="en-IN"/>
           </a:p>
@@ -461,7 +461,7 @@
           <a:p>
             <a:fld id="{A836C3DE-AC88-4268-9D6B-389508348846}" type="datetimeFigureOut">
               <a:rPr lang="en-IN" smtClean="0"/>
-              <a:t>04-08-2024</a:t>
+              <a:t>22-11-2024</a:t>
             </a:fld>
             <a:endParaRPr lang="en-IN"/>
           </a:p>
@@ -671,7 +671,7 @@
           <a:p>
             <a:fld id="{A836C3DE-AC88-4268-9D6B-389508348846}" type="datetimeFigureOut">
               <a:rPr lang="en-IN" smtClean="0"/>
-              <a:t>04-08-2024</a:t>
+              <a:t>22-11-2024</a:t>
             </a:fld>
             <a:endParaRPr lang="en-IN"/>
           </a:p>
@@ -871,7 +871,7 @@
           <a:p>
             <a:fld id="{A836C3DE-AC88-4268-9D6B-389508348846}" type="datetimeFigureOut">
               <a:rPr lang="en-IN" smtClean="0"/>
-              <a:t>04-08-2024</a:t>
+              <a:t>22-11-2024</a:t>
             </a:fld>
             <a:endParaRPr lang="en-IN"/>
           </a:p>
@@ -1147,7 +1147,7 @@
           <a:p>
             <a:fld id="{A836C3DE-AC88-4268-9D6B-389508348846}" type="datetimeFigureOut">
               <a:rPr lang="en-IN" smtClean="0"/>
-              <a:t>04-08-2024</a:t>
+              <a:t>22-11-2024</a:t>
             </a:fld>
             <a:endParaRPr lang="en-IN"/>
           </a:p>
@@ -1415,7 +1415,7 @@
           <a:p>
             <a:fld id="{A836C3DE-AC88-4268-9D6B-389508348846}" type="datetimeFigureOut">
               <a:rPr lang="en-IN" smtClean="0"/>
-              <a:t>04-08-2024</a:t>
+              <a:t>22-11-2024</a:t>
             </a:fld>
             <a:endParaRPr lang="en-IN"/>
           </a:p>
@@ -1830,7 +1830,7 @@
           <a:p>
             <a:fld id="{A836C3DE-AC88-4268-9D6B-389508348846}" type="datetimeFigureOut">
               <a:rPr lang="en-IN" smtClean="0"/>
-              <a:t>04-08-2024</a:t>
+              <a:t>22-11-2024</a:t>
             </a:fld>
             <a:endParaRPr lang="en-IN"/>
           </a:p>
@@ -1972,7 +1972,7 @@
           <a:p>
             <a:fld id="{A836C3DE-AC88-4268-9D6B-389508348846}" type="datetimeFigureOut">
               <a:rPr lang="en-IN" smtClean="0"/>
-              <a:t>04-08-2024</a:t>
+              <a:t>22-11-2024</a:t>
             </a:fld>
             <a:endParaRPr lang="en-IN"/>
           </a:p>
@@ -2085,7 +2085,7 @@
           <a:p>
             <a:fld id="{A836C3DE-AC88-4268-9D6B-389508348846}" type="datetimeFigureOut">
               <a:rPr lang="en-IN" smtClean="0"/>
-              <a:t>04-08-2024</a:t>
+              <a:t>22-11-2024</a:t>
             </a:fld>
             <a:endParaRPr lang="en-IN"/>
           </a:p>
@@ -2398,7 +2398,7 @@
           <a:p>
             <a:fld id="{A836C3DE-AC88-4268-9D6B-389508348846}" type="datetimeFigureOut">
               <a:rPr lang="en-IN" smtClean="0"/>
-              <a:t>04-08-2024</a:t>
+              <a:t>22-11-2024</a:t>
             </a:fld>
             <a:endParaRPr lang="en-IN"/>
           </a:p>
@@ -2687,7 +2687,7 @@
           <a:p>
             <a:fld id="{A836C3DE-AC88-4268-9D6B-389508348846}" type="datetimeFigureOut">
               <a:rPr lang="en-IN" smtClean="0"/>
-              <a:t>04-08-2024</a:t>
+              <a:t>22-11-2024</a:t>
             </a:fld>
             <a:endParaRPr lang="en-IN"/>
           </a:p>
@@ -2930,7 +2930,7 @@
           <a:p>
             <a:fld id="{A836C3DE-AC88-4268-9D6B-389508348846}" type="datetimeFigureOut">
               <a:rPr lang="en-IN" smtClean="0"/>
-              <a:t>04-08-2024</a:t>
+              <a:t>22-11-2024</a:t>
             </a:fld>
             <a:endParaRPr lang="en-IN"/>
           </a:p>
@@ -3431,7 +3431,7 @@
             <a:pPr algn="ctr"/>
             <a:r>
               <a:rPr lang="en-IN" dirty="0">
-                <a:hlinkClick r:id="rId2" action="ppaction://hlinkpres?slideindex=1&amp;slidetitle="/>
+                <a:hlinkClick r:id="rId2" action="ppaction://hlinkfile"/>
               </a:rPr>
               <a:t>Unit 1</a:t>
             </a:r>

</xml_diff>